<commit_message>
MODIFY DreamTD_FeaturesRelated.pptx |ADD ProjectilesUpgrade_Meta.xlsx
</commit_message>
<xml_diff>
--- a/Documents/GameDesign/DreamTD_FeaturesRelated.pptx
+++ b/Documents/GameDesign/DreamTD_FeaturesRelated.pptx
@@ -9,6 +9,7 @@
     <p:sldId id="257" r:id="rId3"/>
     <p:sldId id="258" r:id="rId4"/>
     <p:sldId id="259" r:id="rId5"/>
+    <p:sldId id="260" r:id="rId6"/>
   </p:sldIdLst>
   <p:sldSz cx="12192000" cy="6858000"/>
   <p:notesSz cx="6858000" cy="9144000"/>
@@ -3713,10 +3714,10 @@
       </p:sp>
       <p:pic>
         <p:nvPicPr>
-          <p:cNvPr id="6" name="Image 5">
-            <a:extLst>
-              <a:ext uri="{FF2B5EF4-FFF2-40B4-BE49-F238E27FC236}">
-                <a16:creationId xmlns:a16="http://schemas.microsoft.com/office/drawing/2014/main" id="{E484D138-C0EA-D55E-6C82-9DFAD1428574}"/>
+          <p:cNvPr id="8" name="Image 7">
+            <a:extLst>
+              <a:ext uri="{FF2B5EF4-FFF2-40B4-BE49-F238E27FC236}">
+                <a16:creationId xmlns:a16="http://schemas.microsoft.com/office/drawing/2014/main" id="{90D3C1A3-0967-EDAA-5CB9-DD2CB1AE6A54}"/>
               </a:ext>
             </a:extLst>
           </p:cNvPr>
@@ -3739,12 +3740,15 @@
         </p:blipFill>
         <p:spPr>
           <a:xfrm>
-            <a:off x="183582" y="1424774"/>
-            <a:ext cx="6407341" cy="4460536"/>
+            <a:off x="206824" y="1343686"/>
+            <a:ext cx="6619490" cy="4699503"/>
           </a:xfrm>
           <a:prstGeom prst="rect">
             <a:avLst/>
           </a:prstGeom>
+          <a:effectLst>
+            <a:softEdge rad="31750"/>
+          </a:effectLst>
         </p:spPr>
       </p:pic>
     </p:spTree>
@@ -3828,8 +3832,8 @@
         </p:nvSpPr>
         <p:spPr>
           <a:xfrm>
-            <a:off x="615635" y="1530036"/>
-            <a:ext cx="6455121" cy="1413720"/>
+            <a:off x="615635" y="2082157"/>
+            <a:ext cx="7004365" cy="2693686"/>
           </a:xfrm>
           <a:prstGeom prst="rect">
             <a:avLst/>
@@ -3844,13 +3848,13 @@
           <a:p>
             <a:pPr marL="285750" indent="-285750">
               <a:lnSpc>
-                <a:spcPct val="150000"/>
+                <a:spcPct val="250000"/>
               </a:lnSpc>
               <a:buFont typeface="Arial" panose="020B0604020202020204" pitchFamily="34" charset="0"/>
               <a:buChar char="•"/>
             </a:pPr>
             <a:r>
-              <a:rPr lang="en-US" sz="2000" dirty="0">
+              <a:rPr lang="en-US" sz="2400" dirty="0">
                 <a:solidFill>
                   <a:schemeClr val="bg1"/>
                 </a:solidFill>
@@ -3862,13 +3866,13 @@
           <a:p>
             <a:pPr marL="285750" indent="-285750">
               <a:lnSpc>
-                <a:spcPct val="150000"/>
+                <a:spcPct val="250000"/>
               </a:lnSpc>
               <a:buFont typeface="Arial" panose="020B0604020202020204" pitchFamily="34" charset="0"/>
               <a:buChar char="•"/>
             </a:pPr>
             <a:r>
-              <a:rPr lang="en-US" sz="2000" dirty="0">
+              <a:rPr lang="en-US" sz="2400" dirty="0">
                 <a:solidFill>
                   <a:schemeClr val="bg1"/>
                 </a:solidFill>
@@ -3880,37 +3884,19 @@
           <a:p>
             <a:pPr marL="285750" indent="-285750">
               <a:lnSpc>
-                <a:spcPct val="150000"/>
+                <a:spcPct val="250000"/>
               </a:lnSpc>
               <a:buFont typeface="Arial" panose="020B0604020202020204" pitchFamily="34" charset="0"/>
               <a:buChar char="•"/>
             </a:pPr>
             <a:r>
-              <a:rPr lang="en-US" sz="2000" dirty="0">
+              <a:rPr lang="en-US" sz="2400" dirty="0">
                 <a:solidFill>
                   <a:schemeClr val="bg1"/>
                 </a:solidFill>
                 <a:latin typeface="Heading Now Trial 43 Book" panose="00000400000000000000" pitchFamily="2" charset="0"/>
               </a:rPr>
-              <a:t>The train cannot be stopped, and it </a:t>
-            </a:r>
-            <a:r>
-              <a:rPr lang="en-US" sz="2000">
-                <a:solidFill>
-                  <a:schemeClr val="bg1"/>
-                </a:solidFill>
-                <a:latin typeface="Heading Now Trial 43 Book" panose="00000400000000000000" pitchFamily="2" charset="0"/>
-              </a:rPr>
-              <a:t>always move in </a:t>
-            </a:r>
-            <a:r>
-              <a:rPr lang="en-US" sz="2000" dirty="0">
-                <a:solidFill>
-                  <a:schemeClr val="bg1"/>
-                </a:solidFill>
-                <a:latin typeface="Heading Now Trial 43 Book" panose="00000400000000000000" pitchFamily="2" charset="0"/>
-              </a:rPr>
-              <a:t>the same direction. </a:t>
+              <a:t>The train cannot be stopped, and it always move in the same direction. </a:t>
             </a:r>
           </a:p>
         </p:txBody>
@@ -3919,6 +3905,73 @@
     <p:extLst>
       <p:ext uri="{BB962C8B-B14F-4D97-AF65-F5344CB8AC3E}">
         <p14:creationId xmlns:p14="http://schemas.microsoft.com/office/powerpoint/2010/main" val="979254468"/>
+      </p:ext>
+    </p:extLst>
+  </p:cSld>
+  <p:clrMapOvr>
+    <a:masterClrMapping/>
+  </p:clrMapOvr>
+</p:sld>
+</file>
+
+<file path=ppt/slides/slide5.xml><?xml version="1.0" encoding="utf-8"?>
+<p:sld xmlns:a="http://schemas.openxmlformats.org/drawingml/2006/main" xmlns:r="http://schemas.openxmlformats.org/officeDocument/2006/relationships" xmlns:p="http://schemas.openxmlformats.org/presentationml/2006/main">
+  <p:cSld>
+    <p:spTree>
+      <p:nvGrpSpPr>
+        <p:cNvPr id="1" name=""/>
+        <p:cNvGrpSpPr/>
+        <p:nvPr/>
+      </p:nvGrpSpPr>
+      <p:grpSpPr>
+        <a:xfrm>
+          <a:off x="0" y="0"/>
+          <a:ext cx="0" cy="0"/>
+          <a:chOff x="0" y="0"/>
+          <a:chExt cx="0" cy="0"/>
+        </a:xfrm>
+      </p:grpSpPr>
+      <p:sp>
+        <p:nvSpPr>
+          <p:cNvPr id="4" name="Titre 3">
+            <a:extLst>
+              <a:ext uri="{FF2B5EF4-FFF2-40B4-BE49-F238E27FC236}">
+                <a16:creationId xmlns:a16="http://schemas.microsoft.com/office/drawing/2014/main" id="{A721A66B-DBE9-EE9C-CB7A-3C48BCA43BF8}"/>
+              </a:ext>
+            </a:extLst>
+          </p:cNvPr>
+          <p:cNvSpPr>
+            <a:spLocks noGrp="1"/>
+          </p:cNvSpPr>
+          <p:nvPr>
+            <p:ph type="title"/>
+          </p:nvPr>
+        </p:nvSpPr>
+        <p:spPr/>
+        <p:txBody>
+          <a:bodyPr/>
+          <a:lstStyle/>
+          <a:p>
+            <a:r>
+              <a:rPr lang="en-US" dirty="0"/>
+              <a:t>Train Feature </a:t>
+            </a:r>
+            <a:r>
+              <a:rPr lang="en-US" sz="3200" dirty="0">
+                <a:latin typeface="Heading Now Trial 43 Book" panose="00000400000000000000" pitchFamily="2" charset="0"/>
+              </a:rPr>
+              <a:t>– Container</a:t>
+            </a:r>
+            <a:endParaRPr lang="en-US" dirty="0">
+              <a:latin typeface="Heading Now Trial 43 Book" panose="00000400000000000000" pitchFamily="2" charset="0"/>
+            </a:endParaRPr>
+          </a:p>
+        </p:txBody>
+      </p:sp>
+    </p:spTree>
+    <p:extLst>
+      <p:ext uri="{BB962C8B-B14F-4D97-AF65-F5344CB8AC3E}">
+        <p14:creationId xmlns:p14="http://schemas.microsoft.com/office/powerpoint/2010/main" val="1412911363"/>
       </p:ext>
     </p:extLst>
   </p:cSld>

</xml_diff>